<commit_message>
Poster complete with the PDF. It's sent to get print now.
</commit_message>
<xml_diff>
--- a/Documents/Poster/Poster.pptx
+++ b/Documents/Poster/Poster.pptx
@@ -254,7 +254,7 @@
           <a:p>
             <a:fld id="{043B6D9D-4A40-468E-8A55-76E991955273}" type="datetimeFigureOut">
               <a:rPr lang="en-US" smtClean="0"/>
-              <a:t>4/13/2016</a:t>
+              <a:t>4/14/2016</a:t>
             </a:fld>
             <a:endParaRPr lang="en-US"/>
           </a:p>
@@ -424,7 +424,7 @@
           <a:p>
             <a:fld id="{043B6D9D-4A40-468E-8A55-76E991955273}" type="datetimeFigureOut">
               <a:rPr lang="en-US" smtClean="0"/>
-              <a:t>4/13/2016</a:t>
+              <a:t>4/14/2016</a:t>
             </a:fld>
             <a:endParaRPr lang="en-US"/>
           </a:p>
@@ -604,7 +604,7 @@
           <a:p>
             <a:fld id="{043B6D9D-4A40-468E-8A55-76E991955273}" type="datetimeFigureOut">
               <a:rPr lang="en-US" smtClean="0"/>
-              <a:t>4/13/2016</a:t>
+              <a:t>4/14/2016</a:t>
             </a:fld>
             <a:endParaRPr lang="en-US"/>
           </a:p>
@@ -774,7 +774,7 @@
           <a:p>
             <a:fld id="{043B6D9D-4A40-468E-8A55-76E991955273}" type="datetimeFigureOut">
               <a:rPr lang="en-US" smtClean="0"/>
-              <a:t>4/13/2016</a:t>
+              <a:t>4/14/2016</a:t>
             </a:fld>
             <a:endParaRPr lang="en-US"/>
           </a:p>
@@ -1018,7 +1018,7 @@
           <a:p>
             <a:fld id="{043B6D9D-4A40-468E-8A55-76E991955273}" type="datetimeFigureOut">
               <a:rPr lang="en-US" smtClean="0"/>
-              <a:t>4/13/2016</a:t>
+              <a:t>4/14/2016</a:t>
             </a:fld>
             <a:endParaRPr lang="en-US"/>
           </a:p>
@@ -1250,7 +1250,7 @@
           <a:p>
             <a:fld id="{043B6D9D-4A40-468E-8A55-76E991955273}" type="datetimeFigureOut">
               <a:rPr lang="en-US" smtClean="0"/>
-              <a:t>4/13/2016</a:t>
+              <a:t>4/14/2016</a:t>
             </a:fld>
             <a:endParaRPr lang="en-US"/>
           </a:p>
@@ -1617,7 +1617,7 @@
           <a:p>
             <a:fld id="{043B6D9D-4A40-468E-8A55-76E991955273}" type="datetimeFigureOut">
               <a:rPr lang="en-US" smtClean="0"/>
-              <a:t>4/13/2016</a:t>
+              <a:t>4/14/2016</a:t>
             </a:fld>
             <a:endParaRPr lang="en-US"/>
           </a:p>
@@ -1735,7 +1735,7 @@
           <a:p>
             <a:fld id="{043B6D9D-4A40-468E-8A55-76E991955273}" type="datetimeFigureOut">
               <a:rPr lang="en-US" smtClean="0"/>
-              <a:t>4/13/2016</a:t>
+              <a:t>4/14/2016</a:t>
             </a:fld>
             <a:endParaRPr lang="en-US"/>
           </a:p>
@@ -1830,7 +1830,7 @@
           <a:p>
             <a:fld id="{043B6D9D-4A40-468E-8A55-76E991955273}" type="datetimeFigureOut">
               <a:rPr lang="en-US" smtClean="0"/>
-              <a:t>4/13/2016</a:t>
+              <a:t>4/14/2016</a:t>
             </a:fld>
             <a:endParaRPr lang="en-US"/>
           </a:p>
@@ -2107,7 +2107,7 @@
           <a:p>
             <a:fld id="{043B6D9D-4A40-468E-8A55-76E991955273}" type="datetimeFigureOut">
               <a:rPr lang="en-US" smtClean="0"/>
-              <a:t>4/13/2016</a:t>
+              <a:t>4/14/2016</a:t>
             </a:fld>
             <a:endParaRPr lang="en-US"/>
           </a:p>
@@ -2364,7 +2364,7 @@
           <a:p>
             <a:fld id="{043B6D9D-4A40-468E-8A55-76E991955273}" type="datetimeFigureOut">
               <a:rPr lang="en-US" smtClean="0"/>
-              <a:t>4/13/2016</a:t>
+              <a:t>4/14/2016</a:t>
             </a:fld>
             <a:endParaRPr lang="en-US"/>
           </a:p>
@@ -2577,7 +2577,7 @@
           <a:p>
             <a:fld id="{043B6D9D-4A40-468E-8A55-76E991955273}" type="datetimeFigureOut">
               <a:rPr lang="en-US" smtClean="0"/>
-              <a:t>4/13/2016</a:t>
+              <a:t>4/14/2016</a:t>
             </a:fld>
             <a:endParaRPr lang="en-US"/>
           </a:p>
@@ -2971,8 +2971,9 @@
     <p:bg>
       <p:bgPr>
         <a:solidFill>
-          <a:schemeClr val="bg2">
-            <a:lumMod val="75000"/>
+          <a:schemeClr val="tx2">
+            <a:lumMod val="20000"/>
+            <a:lumOff val="80000"/>
           </a:schemeClr>
         </a:solidFill>
         <a:effectLst/>
@@ -3012,6 +3013,9 @@
               <a:lumOff val="40000"/>
             </a:schemeClr>
           </a:solidFill>
+          <a:ln>
+            <a:noFill/>
+          </a:ln>
         </p:spPr>
         <p:style>
           <a:lnRef idx="2">
@@ -3162,7 +3166,7 @@
         </p:nvSpPr>
         <p:spPr>
           <a:xfrm>
-            <a:off x="27584400" y="6400800"/>
+            <a:off x="27584400" y="6185563"/>
             <a:ext cx="11658600" cy="22783800"/>
           </a:xfrm>
           <a:prstGeom prst="rect">
@@ -3193,7 +3197,7 @@
           <a:lstStyle/>
           <a:p>
             <a:pPr algn="ctr"/>
-            <a:endParaRPr lang="en-US"/>
+            <a:endParaRPr lang="en-US" dirty="0"/>
           </a:p>
         </p:txBody>
       </p:sp>
@@ -3248,7 +3252,7 @@
         </p:blipFill>
         <p:spPr>
           <a:xfrm rot="16200000">
-            <a:off x="17191088" y="8706523"/>
+            <a:off x="17191088" y="8096885"/>
             <a:ext cx="5826026" cy="9710043"/>
           </a:xfrm>
           <a:prstGeom prst="rect">
@@ -3263,62 +3267,22 @@
       </p:pic>
       <p:sp>
         <p:nvSpPr>
-          <p:cNvPr id="11" name="Rectangle 10"/>
-          <p:cNvSpPr/>
-          <p:nvPr/>
-        </p:nvSpPr>
-        <p:spPr>
-          <a:xfrm>
-            <a:off x="33680400" y="0"/>
-            <a:ext cx="6553200" cy="5486400"/>
-          </a:xfrm>
-          <a:prstGeom prst="rect">
-            <a:avLst/>
-          </a:prstGeom>
-          <a:solidFill>
-            <a:srgbClr val="00518E"/>
-          </a:solidFill>
-        </p:spPr>
-        <p:style>
-          <a:lnRef idx="2">
-            <a:schemeClr val="accent1">
-              <a:shade val="50000"/>
-            </a:schemeClr>
-          </a:lnRef>
-          <a:fillRef idx="1">
-            <a:schemeClr val="accent1"/>
-          </a:fillRef>
-          <a:effectRef idx="0">
-            <a:schemeClr val="accent1"/>
-          </a:effectRef>
-          <a:fontRef idx="minor">
-            <a:schemeClr val="lt1"/>
-          </a:fontRef>
-        </p:style>
-        <p:txBody>
-          <a:bodyPr rtlCol="0" anchor="ctr"/>
-          <a:lstStyle/>
-          <a:p>
-            <a:pPr algn="ctr"/>
-            <a:endParaRPr lang="en-US"/>
-          </a:p>
-        </p:txBody>
-      </p:sp>
-      <p:sp>
-        <p:nvSpPr>
           <p:cNvPr id="12" name="TextBox 11"/>
           <p:cNvSpPr txBox="1"/>
           <p:nvPr/>
         </p:nvSpPr>
         <p:spPr>
           <a:xfrm>
-            <a:off x="5486400" y="55111"/>
-            <a:ext cx="28194000" cy="5490477"/>
+            <a:off x="5829300" y="-4077"/>
+            <a:ext cx="26966222" cy="5490477"/>
           </a:xfrm>
           <a:prstGeom prst="rect">
             <a:avLst/>
           </a:prstGeom>
           <a:noFill/>
+          <a:ln>
+            <a:noFill/>
+          </a:ln>
         </p:spPr>
         <p:txBody>
           <a:bodyPr wrap="square" rtlCol="0">
@@ -3381,8 +3345,8 @@
         </p:nvSpPr>
         <p:spPr>
           <a:xfrm>
-            <a:off x="1085788" y="6517134"/>
-            <a:ext cx="11734800" cy="1306724"/>
+            <a:off x="1066800" y="6473647"/>
+            <a:ext cx="11696576" cy="1306724"/>
           </a:xfrm>
           <a:prstGeom prst="rect">
             <a:avLst/>
@@ -3409,7 +3373,6 @@
               <a:rPr lang="en-US" b="1" dirty="0" smtClean="0"/>
               <a:t>ODROID vs Raspberry Pi</a:t>
             </a:r>
-            <a:endParaRPr lang="en-US" b="1" dirty="0" smtClean="0"/>
           </a:p>
         </p:txBody>
       </p:sp>
@@ -3435,8 +3398,8 @@
         </p:blipFill>
         <p:spPr>
           <a:xfrm>
-            <a:off x="1164528" y="11734800"/>
-            <a:ext cx="11463143" cy="4962525"/>
+            <a:off x="1316085" y="11430000"/>
+            <a:ext cx="11283679" cy="4884833"/>
           </a:xfrm>
           <a:prstGeom prst="rect">
             <a:avLst/>
@@ -3451,8 +3414,8 @@
         </p:nvSpPr>
         <p:spPr>
           <a:xfrm>
-            <a:off x="14277241" y="6477000"/>
-            <a:ext cx="11706959" cy="2976071"/>
+            <a:off x="14287375" y="6477000"/>
+            <a:ext cx="11696825" cy="2976071"/>
           </a:xfrm>
           <a:prstGeom prst="rect">
             <a:avLst/>
@@ -3494,8 +3457,8 @@
         </p:nvSpPr>
         <p:spPr>
           <a:xfrm>
-            <a:off x="1085788" y="17145000"/>
-            <a:ext cx="11658600" cy="1283300"/>
+            <a:off x="1066800" y="16840200"/>
+            <a:ext cx="11696700" cy="1283300"/>
           </a:xfrm>
           <a:prstGeom prst="rect">
             <a:avLst/>
@@ -3534,7 +3497,7 @@
         </p:nvSpPr>
         <p:spPr>
           <a:xfrm>
-            <a:off x="1371600" y="18592800"/>
+            <a:off x="1371600" y="18288000"/>
             <a:ext cx="10820400" cy="5478423"/>
           </a:xfrm>
           <a:prstGeom prst="rect">
@@ -3632,7 +3595,7 @@
         </p:nvSpPr>
         <p:spPr>
           <a:xfrm>
-            <a:off x="1066800" y="24155400"/>
+            <a:off x="1066800" y="24079200"/>
             <a:ext cx="11696576" cy="1384801"/>
           </a:xfrm>
           <a:prstGeom prst="rect">
@@ -3709,7 +3672,7 @@
         </p:nvSpPr>
         <p:spPr>
           <a:xfrm>
-            <a:off x="1228552" y="8196045"/>
+            <a:off x="1228552" y="7924800"/>
             <a:ext cx="11458747" cy="3416320"/>
           </a:xfrm>
           <a:prstGeom prst="rect">
@@ -3742,8 +3705,8 @@
         </p:nvSpPr>
         <p:spPr>
           <a:xfrm>
-            <a:off x="27574142" y="6400800"/>
-            <a:ext cx="11726008" cy="1322775"/>
+            <a:off x="27584402" y="6173463"/>
+            <a:ext cx="11658598" cy="1322775"/>
           </a:xfrm>
           <a:prstGeom prst="rect">
             <a:avLst/>
@@ -3770,7 +3733,6 @@
               <a:rPr lang="en-US" b="1" dirty="0" smtClean="0"/>
               <a:t>Topology</a:t>
             </a:r>
-            <a:endParaRPr lang="en-US" b="1" dirty="0" smtClean="0"/>
           </a:p>
         </p:txBody>
       </p:sp>
@@ -3782,7 +3744,7 @@
         </p:nvSpPr>
         <p:spPr>
           <a:xfrm>
-            <a:off x="27594658" y="19086421"/>
+            <a:off x="27584400" y="15697200"/>
             <a:ext cx="11658600" cy="1283300"/>
           </a:xfrm>
           <a:prstGeom prst="rect">
@@ -3810,7 +3772,6 @@
               <a:rPr lang="en-US" b="1" dirty="0" smtClean="0"/>
               <a:t>Results</a:t>
             </a:r>
-            <a:endParaRPr lang="en-US" b="1" dirty="0" smtClean="0"/>
           </a:p>
         </p:txBody>
       </p:sp>
@@ -3822,8 +3783,8 @@
         </p:nvSpPr>
         <p:spPr>
           <a:xfrm>
-            <a:off x="14277241" y="19728070"/>
-            <a:ext cx="11706959" cy="1283300"/>
+            <a:off x="14287375" y="16852300"/>
+            <a:ext cx="11696825" cy="1283300"/>
           </a:xfrm>
           <a:prstGeom prst="rect">
             <a:avLst/>
@@ -3850,7 +3811,6 @@
               <a:rPr lang="en-US" b="1" dirty="0" smtClean="0"/>
               <a:t>Communication</a:t>
             </a:r>
-            <a:endParaRPr lang="en-US" b="1" dirty="0" smtClean="0"/>
           </a:p>
         </p:txBody>
       </p:sp>
@@ -4039,7 +3999,7 @@
         </p:blipFill>
         <p:spPr>
           <a:xfrm>
-            <a:off x="14668438" y="22057082"/>
+            <a:off x="14668438" y="21793200"/>
             <a:ext cx="5234940" cy="2865120"/>
           </a:xfrm>
           <a:prstGeom prst="rect">
@@ -4068,7 +4028,7 @@
         </p:blipFill>
         <p:spPr>
           <a:xfrm>
-            <a:off x="14668438" y="25603200"/>
+            <a:off x="14668438" y="25450800"/>
             <a:ext cx="5222999" cy="3047031"/>
           </a:xfrm>
           <a:prstGeom prst="rect">
@@ -4098,17 +4058,50 @@
         </p:blipFill>
         <p:spPr>
           <a:xfrm>
-            <a:off x="33145006" y="14860382"/>
-            <a:ext cx="5940175" cy="3008518"/>
+            <a:off x="32947225" y="11734800"/>
+            <a:ext cx="6295775" cy="3188619"/>
           </a:xfrm>
           <a:prstGeom prst="rect">
             <a:avLst/>
           </a:prstGeom>
         </p:spPr>
       </p:pic>
+      <p:sp>
+        <p:nvSpPr>
+          <p:cNvPr id="43" name="TextBox 42"/>
+          <p:cNvSpPr txBox="1"/>
+          <p:nvPr/>
+        </p:nvSpPr>
+        <p:spPr>
+          <a:xfrm>
+            <a:off x="27968575" y="7564428"/>
+            <a:ext cx="10893425" cy="4170372"/>
+          </a:xfrm>
+          <a:prstGeom prst="rect">
+            <a:avLst/>
+          </a:prstGeom>
+          <a:noFill/>
+        </p:spPr>
+        <p:txBody>
+          <a:bodyPr wrap="square" rtlCol="0">
+            <a:spAutoFit/>
+          </a:bodyPr>
+          <a:lstStyle/>
+          <a:p>
+            <a:r>
+              <a:rPr lang="en-US" sz="5300" dirty="0" smtClean="0">
+                <a:solidFill>
+                  <a:schemeClr val="bg1"/>
+                </a:solidFill>
+              </a:rPr>
+              <a:t>The 8 ODROIDS were connected into a Star Topology; each connected to a switch via Ethernet. Ring and Hypercube were connected using an Ethernet-to-USB cord.</a:t>
+            </a:r>
+          </a:p>
+        </p:txBody>
+      </p:sp>
       <p:pic>
         <p:nvPicPr>
-          <p:cNvPr id="42" name="Picture 41"/>
+          <p:cNvPr id="14" name="Picture 13"/>
           <p:cNvPicPr>
             <a:picLocks noChangeAspect="1"/>
           </p:cNvPicPr>
@@ -4128,8 +4121,8 @@
         </p:blipFill>
         <p:spPr>
           <a:xfrm>
-            <a:off x="28168731" y="14462383"/>
-            <a:ext cx="4785775" cy="3627434"/>
+            <a:off x="27966987" y="21336000"/>
+            <a:ext cx="10893425" cy="6743120"/>
           </a:xfrm>
           <a:prstGeom prst="rect">
             <a:avLst/>
@@ -4138,13 +4131,380 @@
       </p:pic>
       <p:sp>
         <p:nvSpPr>
-          <p:cNvPr id="43" name="TextBox 42"/>
+          <p:cNvPr id="32" name="Rectangle 31"/>
+          <p:cNvSpPr/>
+          <p:nvPr/>
+        </p:nvSpPr>
+        <p:spPr>
+          <a:xfrm>
+            <a:off x="32833622" y="0"/>
+            <a:ext cx="1837377" cy="5486400"/>
+          </a:xfrm>
+          <a:prstGeom prst="rect">
+            <a:avLst/>
+          </a:prstGeom>
+          <a:solidFill>
+            <a:srgbClr val="00518E"/>
+          </a:solidFill>
+          <a:ln>
+            <a:noFill/>
+          </a:ln>
+        </p:spPr>
+        <p:style>
+          <a:lnRef idx="2">
+            <a:schemeClr val="accent1">
+              <a:shade val="50000"/>
+            </a:schemeClr>
+          </a:lnRef>
+          <a:fillRef idx="1">
+            <a:schemeClr val="accent1"/>
+          </a:fillRef>
+          <a:effectRef idx="0">
+            <a:schemeClr val="accent1"/>
+          </a:effectRef>
+          <a:fontRef idx="minor">
+            <a:schemeClr val="lt1"/>
+          </a:fontRef>
+        </p:style>
+        <p:txBody>
+          <a:bodyPr rtlCol="0" anchor="ctr"/>
+          <a:lstStyle/>
+          <a:p>
+            <a:endParaRPr lang="en-US" sz="6000" dirty="0">
+              <a:latin typeface="+mj-lt"/>
+            </a:endParaRPr>
+          </a:p>
+        </p:txBody>
+      </p:sp>
+      <p:sp>
+        <p:nvSpPr>
+          <p:cNvPr id="11" name="Rectangle 10"/>
+          <p:cNvSpPr/>
+          <p:nvPr/>
+        </p:nvSpPr>
+        <p:spPr>
+          <a:xfrm>
+            <a:off x="33680400" y="0"/>
+            <a:ext cx="6553200" cy="5486400"/>
+          </a:xfrm>
+          <a:prstGeom prst="rect">
+            <a:avLst/>
+          </a:prstGeom>
+          <a:solidFill>
+            <a:srgbClr val="00518E"/>
+          </a:solidFill>
+          <a:ln>
+            <a:noFill/>
+          </a:ln>
+        </p:spPr>
+        <p:style>
+          <a:lnRef idx="2">
+            <a:schemeClr val="accent1">
+              <a:shade val="50000"/>
+            </a:schemeClr>
+          </a:lnRef>
+          <a:fillRef idx="1">
+            <a:schemeClr val="accent1"/>
+          </a:fillRef>
+          <a:effectRef idx="0">
+            <a:schemeClr val="accent1"/>
+          </a:effectRef>
+          <a:fontRef idx="minor">
+            <a:schemeClr val="lt1"/>
+          </a:fontRef>
+        </p:style>
+        <p:txBody>
+          <a:bodyPr rtlCol="0" anchor="ctr"/>
+          <a:lstStyle/>
+          <a:p>
+            <a:r>
+              <a:rPr lang="en-US" sz="6000" b="1" dirty="0" smtClean="0">
+                <a:latin typeface="+mj-lt"/>
+              </a:rPr>
+              <a:t>Acknowledgments</a:t>
+            </a:r>
+            <a:endParaRPr lang="en-US" sz="6000" b="1" dirty="0">
+              <a:latin typeface="+mj-lt"/>
+            </a:endParaRPr>
+          </a:p>
+          <a:p>
+            <a:r>
+              <a:rPr lang="en-US" sz="6000" dirty="0">
+                <a:latin typeface="+mj-lt"/>
+              </a:rPr>
+              <a:t>Dr. Jeff McGough</a:t>
+            </a:r>
+          </a:p>
+          <a:p>
+            <a:r>
+              <a:rPr lang="en-US" sz="6000" dirty="0">
+                <a:latin typeface="+mj-lt"/>
+              </a:rPr>
+              <a:t>Dr. </a:t>
+            </a:r>
+            <a:r>
+              <a:rPr lang="en-US" sz="6000" dirty="0" err="1">
+                <a:latin typeface="+mj-lt"/>
+              </a:rPr>
+              <a:t>Mengyu</a:t>
+            </a:r>
+            <a:r>
+              <a:rPr lang="en-US" sz="6000" dirty="0">
+                <a:latin typeface="+mj-lt"/>
+              </a:rPr>
+              <a:t> </a:t>
+            </a:r>
+            <a:r>
+              <a:rPr lang="en-US" sz="6000" dirty="0" err="1">
+                <a:latin typeface="+mj-lt"/>
+              </a:rPr>
+              <a:t>Qiao</a:t>
+            </a:r>
+            <a:endParaRPr lang="en-US" sz="6000" dirty="0">
+              <a:latin typeface="+mj-lt"/>
+            </a:endParaRPr>
+          </a:p>
+          <a:p>
+            <a:r>
+              <a:rPr lang="en-US" sz="6000" dirty="0">
+                <a:latin typeface="+mj-lt"/>
+              </a:rPr>
+              <a:t>Steph </a:t>
+            </a:r>
+            <a:r>
+              <a:rPr lang="en-US" sz="6000" dirty="0" err="1">
+                <a:latin typeface="+mj-lt"/>
+              </a:rPr>
+              <a:t>Athow</a:t>
+            </a:r>
+            <a:endParaRPr lang="en-US" sz="6000" dirty="0">
+              <a:latin typeface="+mj-lt"/>
+            </a:endParaRPr>
+          </a:p>
+          <a:p>
+            <a:r>
+              <a:rPr lang="en-US" sz="6000" dirty="0">
+                <a:latin typeface="+mj-lt"/>
+              </a:rPr>
+              <a:t>Dan Nix</a:t>
+            </a:r>
+          </a:p>
+        </p:txBody>
+      </p:sp>
+      <p:grpSp>
+        <p:nvGrpSpPr>
+          <p:cNvPr id="17" name="Group 16"/>
+          <p:cNvGrpSpPr/>
+          <p:nvPr/>
+        </p:nvGrpSpPr>
+        <p:grpSpPr>
+          <a:xfrm>
+            <a:off x="27612726" y="11734800"/>
+            <a:ext cx="5305674" cy="3188619"/>
+            <a:chOff x="28104299" y="12680217"/>
+            <a:chExt cx="4785775" cy="3007987"/>
+          </a:xfrm>
+        </p:grpSpPr>
+        <p:pic>
+          <p:nvPicPr>
+            <p:cNvPr id="42" name="Picture 41"/>
+            <p:cNvPicPr>
+              <a:picLocks noChangeAspect="1"/>
+            </p:cNvPicPr>
+            <p:nvPr/>
+          </p:nvPicPr>
+          <p:blipFill rotWithShape="1">
+            <a:blip r:embed="rId10">
+              <a:extLst>
+                <a:ext uri="{28A0092B-C50C-407E-A947-70E740481C1C}">
+                  <a14:useLocalDpi xmlns:a14="http://schemas.microsoft.com/office/drawing/2010/main" val="0"/>
+                </a:ext>
+              </a:extLst>
+            </a:blip>
+            <a:srcRect b="59584"/>
+            <a:stretch/>
+          </p:blipFill>
+          <p:spPr>
+            <a:xfrm>
+              <a:off x="28104299" y="12680217"/>
+              <a:ext cx="4785775" cy="1466055"/>
+            </a:xfrm>
+            <a:prstGeom prst="rect">
+              <a:avLst/>
+            </a:prstGeom>
+          </p:spPr>
+        </p:pic>
+        <p:pic>
+          <p:nvPicPr>
+            <p:cNvPr id="33" name="Picture 32"/>
+            <p:cNvPicPr>
+              <a:picLocks noChangeAspect="1"/>
+            </p:cNvPicPr>
+            <p:nvPr/>
+          </p:nvPicPr>
+          <p:blipFill rotWithShape="1">
+            <a:blip r:embed="rId10">
+              <a:extLst>
+                <a:ext uri="{28A0092B-C50C-407E-A947-70E740481C1C}">
+                  <a14:useLocalDpi xmlns:a14="http://schemas.microsoft.com/office/drawing/2010/main" val="0"/>
+                </a:ext>
+              </a:extLst>
+            </a:blip>
+            <a:srcRect t="51217"/>
+            <a:stretch/>
+          </p:blipFill>
+          <p:spPr>
+            <a:xfrm>
+              <a:off x="28104299" y="13918645"/>
+              <a:ext cx="4785775" cy="1769559"/>
+            </a:xfrm>
+            <a:prstGeom prst="rect">
+              <a:avLst/>
+            </a:prstGeom>
+          </p:spPr>
+        </p:pic>
+      </p:grpSp>
+      <p:sp>
+        <p:nvSpPr>
+          <p:cNvPr id="35" name="TextBox 34"/>
           <p:cNvSpPr txBox="1"/>
           <p:nvPr/>
         </p:nvSpPr>
         <p:spPr>
           <a:xfrm>
-            <a:off x="27968575" y="7867589"/>
+            <a:off x="14449253" y="18300680"/>
+            <a:ext cx="11458747" cy="3416320"/>
+          </a:xfrm>
+          <a:prstGeom prst="rect">
+            <a:avLst/>
+          </a:prstGeom>
+          <a:noFill/>
+        </p:spPr>
+        <p:txBody>
+          <a:bodyPr wrap="square" rtlCol="0">
+            <a:spAutoFit/>
+          </a:bodyPr>
+          <a:lstStyle/>
+          <a:p>
+            <a:r>
+              <a:rPr lang="en-US" sz="5400" dirty="0" smtClean="0">
+                <a:solidFill>
+                  <a:schemeClr val="bg1"/>
+                </a:solidFill>
+              </a:rPr>
+              <a:t>USB and GPIO connections were tested. Currently, there’s no way to connect through USB, and GPIO was slower than Ethernet.</a:t>
+            </a:r>
+          </a:p>
+        </p:txBody>
+      </p:sp>
+      <p:sp>
+        <p:nvSpPr>
+          <p:cNvPr id="36" name="TextBox 35"/>
+          <p:cNvSpPr txBox="1"/>
+          <p:nvPr/>
+        </p:nvSpPr>
+        <p:spPr>
+          <a:xfrm>
+            <a:off x="28022936" y="28041600"/>
+            <a:ext cx="11458747" cy="769441"/>
+          </a:xfrm>
+          <a:prstGeom prst="rect">
+            <a:avLst/>
+          </a:prstGeom>
+          <a:noFill/>
+        </p:spPr>
+        <p:txBody>
+          <a:bodyPr wrap="square" rtlCol="0">
+            <a:spAutoFit/>
+          </a:bodyPr>
+          <a:lstStyle/>
+          <a:p>
+            <a:r>
+              <a:rPr lang="en-US" sz="4400" i="1" dirty="0" smtClean="0">
+                <a:solidFill>
+                  <a:schemeClr val="bg1"/>
+                </a:solidFill>
+              </a:rPr>
+              <a:t>LINPACK results for star topology on a7’s</a:t>
+            </a:r>
+          </a:p>
+        </p:txBody>
+      </p:sp>
+      <p:sp>
+        <p:nvSpPr>
+          <p:cNvPr id="44" name="TextBox 43"/>
+          <p:cNvSpPr txBox="1"/>
+          <p:nvPr/>
+        </p:nvSpPr>
+        <p:spPr>
+          <a:xfrm>
+            <a:off x="27612726" y="14859000"/>
+            <a:ext cx="11458747" cy="769441"/>
+          </a:xfrm>
+          <a:prstGeom prst="rect">
+            <a:avLst/>
+          </a:prstGeom>
+          <a:noFill/>
+        </p:spPr>
+        <p:txBody>
+          <a:bodyPr wrap="square" rtlCol="0">
+            <a:spAutoFit/>
+          </a:bodyPr>
+          <a:lstStyle/>
+          <a:p>
+            <a:r>
+              <a:rPr lang="en-US" sz="4400" i="1" dirty="0" smtClean="0">
+                <a:solidFill>
+                  <a:schemeClr val="bg1"/>
+                </a:solidFill>
+              </a:rPr>
+              <a:t>Hypercube and Ring Topology</a:t>
+            </a:r>
+          </a:p>
+        </p:txBody>
+      </p:sp>
+      <p:sp>
+        <p:nvSpPr>
+          <p:cNvPr id="45" name="TextBox 44"/>
+          <p:cNvSpPr txBox="1"/>
+          <p:nvPr/>
+        </p:nvSpPr>
+        <p:spPr>
+          <a:xfrm>
+            <a:off x="15249079" y="15850192"/>
+            <a:ext cx="11458747" cy="769441"/>
+          </a:xfrm>
+          <a:prstGeom prst="rect">
+            <a:avLst/>
+          </a:prstGeom>
+          <a:noFill/>
+        </p:spPr>
+        <p:txBody>
+          <a:bodyPr wrap="square" rtlCol="0">
+            <a:spAutoFit/>
+          </a:bodyPr>
+          <a:lstStyle/>
+          <a:p>
+            <a:r>
+              <a:rPr lang="en-US" sz="4400" i="1" dirty="0" smtClean="0">
+                <a:solidFill>
+                  <a:schemeClr val="bg1"/>
+                </a:solidFill>
+              </a:rPr>
+              <a:t>Cluster in Star Topology</a:t>
+            </a:r>
+          </a:p>
+        </p:txBody>
+      </p:sp>
+      <p:sp>
+        <p:nvSpPr>
+          <p:cNvPr id="47" name="TextBox 46"/>
+          <p:cNvSpPr txBox="1"/>
+          <p:nvPr/>
+        </p:nvSpPr>
+        <p:spPr>
+          <a:xfrm>
+            <a:off x="27895386" y="17145000"/>
             <a:ext cx="10893425" cy="4170372"/>
           </a:xfrm>
           <a:prstGeom prst="rect">
@@ -4164,34 +4524,80 @@
                   <a:schemeClr val="bg1"/>
                 </a:solidFill>
               </a:rPr>
-              <a:t>The 8 ODROIDS were connected into a Star Topology; each connected to a switch via Ethernet.</a:t>
-            </a:r>
-          </a:p>
-          <a:p>
-            <a:endParaRPr lang="en-US" sz="5300" dirty="0">
+              <a:t>Using four a7 cores per node, all eight nodes, produced 13.36 Gigaflops. Using two a15 cores per node on all eight nodes produced 26.23 Gigaflops. An i7 device using four cores gave 61.3</a:t>
+            </a:r>
+          </a:p>
+        </p:txBody>
+      </p:sp>
+      <p:sp>
+        <p:nvSpPr>
+          <p:cNvPr id="46" name="TextBox 45"/>
+          <p:cNvSpPr txBox="1"/>
+          <p:nvPr/>
+        </p:nvSpPr>
+        <p:spPr>
+          <a:xfrm>
+            <a:off x="14668438" y="24536400"/>
+            <a:ext cx="11458747" cy="769441"/>
+          </a:xfrm>
+          <a:prstGeom prst="rect">
+            <a:avLst/>
+          </a:prstGeom>
+          <a:noFill/>
+        </p:spPr>
+        <p:txBody>
+          <a:bodyPr wrap="square" rtlCol="0">
+            <a:spAutoFit/>
+          </a:bodyPr>
+          <a:lstStyle/>
+          <a:p>
+            <a:r>
+              <a:rPr lang="en-US" sz="4400" i="1" dirty="0" smtClean="0">
+                <a:solidFill>
+                  <a:schemeClr val="bg1"/>
+                </a:solidFill>
+              </a:rPr>
+              <a:t>Routing Table</a:t>
+            </a:r>
+            <a:endParaRPr lang="en-US" sz="4400" i="1" dirty="0" smtClean="0">
               <a:solidFill>
                 <a:schemeClr val="bg1"/>
               </a:solidFill>
             </a:endParaRPr>
           </a:p>
-          <a:p>
-            <a:r>
-              <a:rPr lang="en-US" sz="5300" dirty="0" smtClean="0">
+        </p:txBody>
+      </p:sp>
+      <p:sp>
+        <p:nvSpPr>
+          <p:cNvPr id="48" name="TextBox 47"/>
+          <p:cNvSpPr txBox="1"/>
+          <p:nvPr/>
+        </p:nvSpPr>
+        <p:spPr>
+          <a:xfrm>
+            <a:off x="14606694" y="28491359"/>
+            <a:ext cx="11458747" cy="769441"/>
+          </a:xfrm>
+          <a:prstGeom prst="rect">
+            <a:avLst/>
+          </a:prstGeom>
+          <a:noFill/>
+        </p:spPr>
+        <p:txBody>
+          <a:bodyPr wrap="square" rtlCol="0">
+            <a:spAutoFit/>
+          </a:bodyPr>
+          <a:lstStyle/>
+          <a:p>
+            <a:r>
+              <a:rPr lang="en-US" sz="4400" i="1" dirty="0" smtClean="0">
                 <a:solidFill>
                   <a:schemeClr val="bg1"/>
                 </a:solidFill>
               </a:rPr>
-              <a:t>Ring </a:t>
-            </a:r>
-            <a:r>
-              <a:rPr lang="en-US" sz="5300" smtClean="0">
-                <a:solidFill>
-                  <a:schemeClr val="bg1"/>
-                </a:solidFill>
-              </a:rPr>
-              <a:t>and Hypercube </a:t>
-            </a:r>
-            <a:endParaRPr lang="en-US" sz="5300" dirty="0" smtClean="0">
+              <a:t>IP Addresses</a:t>
+            </a:r>
+            <a:endParaRPr lang="en-US" sz="4400" i="1" dirty="0" smtClean="0">
               <a:solidFill>
                 <a:schemeClr val="bg1"/>
               </a:solidFill>

</xml_diff>